<commit_message>
req and review updated
</commit_message>
<xml_diff>
--- a/ref/review.pptx
+++ b/ref/review.pptx
@@ -5,7 +5,7 @@
     <p:sldMasterId id="2147483672" r:id="rId1"/>
   </p:sldMasterIdLst>
   <p:notesMasterIdLst>
-    <p:notesMasterId r:id="rId15"/>
+    <p:notesMasterId r:id="rId17"/>
   </p:notesMasterIdLst>
   <p:sldIdLst>
     <p:sldId id="256" r:id="rId2"/>
@@ -15,12 +15,14 @@
     <p:sldId id="275" r:id="rId6"/>
     <p:sldId id="276" r:id="rId7"/>
     <p:sldId id="277" r:id="rId8"/>
-    <p:sldId id="278" r:id="rId9"/>
-    <p:sldId id="279" r:id="rId10"/>
-    <p:sldId id="281" r:id="rId11"/>
-    <p:sldId id="282" r:id="rId12"/>
-    <p:sldId id="283" r:id="rId13"/>
-    <p:sldId id="280" r:id="rId14"/>
+    <p:sldId id="284" r:id="rId9"/>
+    <p:sldId id="285" r:id="rId10"/>
+    <p:sldId id="278" r:id="rId11"/>
+    <p:sldId id="279" r:id="rId12"/>
+    <p:sldId id="281" r:id="rId13"/>
+    <p:sldId id="282" r:id="rId14"/>
+    <p:sldId id="283" r:id="rId15"/>
+    <p:sldId id="280" r:id="rId16"/>
   </p:sldIdLst>
   <p:sldSz cx="12192000" cy="6858000"/>
   <p:notesSz cx="6858000" cy="9144000"/>
@@ -119,6 +121,11 @@
       </a:defRPr>
     </a:lvl9pPr>
   </p:defaultTextStyle>
+  <p:extLst>
+    <p:ext uri="{EFAFB233-063F-42B5-8137-9DF3F51BA10A}">
+      <p15:sldGuideLst xmlns:p15="http://schemas.microsoft.com/office/powerpoint/2012/main"/>
+    </p:ext>
+  </p:extLst>
 </p:presentation>
 </file>
 
@@ -204,7 +211,7 @@
           <a:p>
             <a:fld id="{F7ABECBF-1541-4BFC-93B5-8267AB650DB6}" type="datetimeFigureOut">
               <a:rPr lang="en-IN" smtClean="0"/>
-              <a:t>13-02-2025</a:t>
+              <a:t>05-04-2025</a:t>
             </a:fld>
             <a:endParaRPr lang="en-IN"/>
           </a:p>
@@ -687,7 +694,7 @@
           <a:p>
             <a:fld id="{E50EC797-94D1-44A2-941F-2D9937C69B04}" type="datetime1">
               <a:rPr lang="en-IN" smtClean="0"/>
-              <a:t>14-02-2025</a:t>
+              <a:t>05-04-2025</a:t>
             </a:fld>
             <a:endParaRPr lang="en-IN"/>
           </a:p>
@@ -857,7 +864,7 @@
           <a:p>
             <a:fld id="{5D1DA1A9-DA29-4A73-A166-9CF6AF34A4B0}" type="datetime1">
               <a:rPr lang="en-IN" smtClean="0"/>
-              <a:t>14-02-2025</a:t>
+              <a:t>05-04-2025</a:t>
             </a:fld>
             <a:endParaRPr lang="en-IN"/>
           </a:p>
@@ -1037,7 +1044,7 @@
           <a:p>
             <a:fld id="{00589C0A-F107-4FEE-9FB8-8A209B04316D}" type="datetime1">
               <a:rPr lang="en-IN" smtClean="0"/>
-              <a:t>14-02-2025</a:t>
+              <a:t>05-04-2025</a:t>
             </a:fld>
             <a:endParaRPr lang="en-IN"/>
           </a:p>
@@ -1207,7 +1214,7 @@
           <a:p>
             <a:fld id="{8D91C199-493A-4E7A-B7E8-1E6363532FB5}" type="datetime1">
               <a:rPr lang="en-IN" smtClean="0"/>
-              <a:t>14-02-2025</a:t>
+              <a:t>05-04-2025</a:t>
             </a:fld>
             <a:endParaRPr lang="en-IN"/>
           </a:p>
@@ -1453,7 +1460,7 @@
           <a:p>
             <a:fld id="{9F72E3BF-C0A1-42AF-8D94-C3C32335D92F}" type="datetime1">
               <a:rPr lang="en-IN" smtClean="0"/>
-              <a:t>14-02-2025</a:t>
+              <a:t>05-04-2025</a:t>
             </a:fld>
             <a:endParaRPr lang="en-IN"/>
           </a:p>
@@ -1685,7 +1692,7 @@
           <a:p>
             <a:fld id="{7AA26896-81D7-45A4-85CC-03C1F3844996}" type="datetime1">
               <a:rPr lang="en-IN" smtClean="0"/>
-              <a:t>14-02-2025</a:t>
+              <a:t>05-04-2025</a:t>
             </a:fld>
             <a:endParaRPr lang="en-IN"/>
           </a:p>
@@ -2052,7 +2059,7 @@
           <a:p>
             <a:fld id="{6A54A44D-5B97-49D1-99DF-088DB02E9C18}" type="datetime1">
               <a:rPr lang="en-IN" smtClean="0"/>
-              <a:t>14-02-2025</a:t>
+              <a:t>05-04-2025</a:t>
             </a:fld>
             <a:endParaRPr lang="en-IN"/>
           </a:p>
@@ -2170,7 +2177,7 @@
           <a:p>
             <a:fld id="{ED7C3D1E-BD41-46E8-90F7-3748A2D453E8}" type="datetime1">
               <a:rPr lang="en-IN" smtClean="0"/>
-              <a:t>14-02-2025</a:t>
+              <a:t>05-04-2025</a:t>
             </a:fld>
             <a:endParaRPr lang="en-IN"/>
           </a:p>
@@ -2265,7 +2272,7 @@
           <a:p>
             <a:fld id="{11014AA7-2F80-4A35-A763-FE7D915EA3D6}" type="datetime1">
               <a:rPr lang="en-IN" smtClean="0"/>
-              <a:t>14-02-2025</a:t>
+              <a:t>05-04-2025</a:t>
             </a:fld>
             <a:endParaRPr lang="en-IN"/>
           </a:p>
@@ -2542,7 +2549,7 @@
           <a:p>
             <a:fld id="{F7726069-FD6B-4484-BE47-96CC6ED60812}" type="datetime1">
               <a:rPr lang="en-IN" smtClean="0"/>
-              <a:t>14-02-2025</a:t>
+              <a:t>05-04-2025</a:t>
             </a:fld>
             <a:endParaRPr lang="en-IN"/>
           </a:p>
@@ -2799,7 +2806,7 @@
           <a:p>
             <a:fld id="{6FA2760A-7012-4CC3-8AF7-542AF72AED7A}" type="datetime1">
               <a:rPr lang="en-IN" smtClean="0"/>
-              <a:t>14-02-2025</a:t>
+              <a:t>05-04-2025</a:t>
             </a:fld>
             <a:endParaRPr lang="en-IN"/>
           </a:p>
@@ -3012,7 +3019,7 @@
           <a:p>
             <a:fld id="{CFF7163A-7C59-465F-B09A-A21B2BBCB3B4}" type="datetime1">
               <a:rPr lang="en-IN" smtClean="0"/>
-              <a:t>14-02-2025</a:t>
+              <a:t>05-04-2025</a:t>
             </a:fld>
             <a:endParaRPr lang="en-IN"/>
           </a:p>
@@ -3582,7 +3589,7 @@
         </p:nvSpPr>
         <p:spPr>
           <a:xfrm>
-            <a:off x="8169815" y="4425433"/>
+            <a:off x="8169815" y="4424762"/>
             <a:ext cx="1994170" cy="369332"/>
           </a:xfrm>
           <a:prstGeom prst="rect">
@@ -3654,6 +3661,370 @@
 </file>
 
 <file path=ppt/slides/slide10.xml><?xml version="1.0" encoding="utf-8"?>
+<p:sld xmlns:a="http://schemas.openxmlformats.org/drawingml/2006/main" xmlns:r="http://schemas.openxmlformats.org/officeDocument/2006/relationships" xmlns:p="http://schemas.openxmlformats.org/presentationml/2006/main">
+  <p:cSld>
+    <p:spTree>
+      <p:nvGrpSpPr>
+        <p:cNvPr id="1" name="">
+          <a:extLst>
+            <a:ext uri="{FF2B5EF4-FFF2-40B4-BE49-F238E27FC236}">
+              <a16:creationId xmlns:a16="http://schemas.microsoft.com/office/drawing/2014/main" id="{C6D6722E-1583-8624-5283-A527A3E9BBB8}"/>
+            </a:ext>
+          </a:extLst>
+        </p:cNvPr>
+        <p:cNvGrpSpPr/>
+        <p:nvPr/>
+      </p:nvGrpSpPr>
+      <p:grpSpPr>
+        <a:xfrm>
+          <a:off x="0" y="0"/>
+          <a:ext cx="0" cy="0"/>
+          <a:chOff x="0" y="0"/>
+          <a:chExt cx="0" cy="0"/>
+        </a:xfrm>
+      </p:grpSpPr>
+      <p:sp>
+        <p:nvSpPr>
+          <p:cNvPr id="2" name="Title 1">
+            <a:extLst>
+              <a:ext uri="{FF2B5EF4-FFF2-40B4-BE49-F238E27FC236}">
+                <a16:creationId xmlns:a16="http://schemas.microsoft.com/office/drawing/2014/main" id="{833743C6-5721-44BD-B121-40F746A02E19}"/>
+              </a:ext>
+            </a:extLst>
+          </p:cNvPr>
+          <p:cNvSpPr>
+            <a:spLocks noGrp="1"/>
+          </p:cNvSpPr>
+          <p:nvPr>
+            <p:ph type="title"/>
+          </p:nvPr>
+        </p:nvSpPr>
+        <p:spPr/>
+        <p:txBody>
+          <a:bodyPr/>
+          <a:lstStyle/>
+          <a:p>
+            <a:r>
+              <a:rPr lang="en-US" dirty="0"/>
+              <a:t>Problem Statement</a:t>
+            </a:r>
+            <a:endParaRPr lang="en-IN" dirty="0"/>
+          </a:p>
+        </p:txBody>
+      </p:sp>
+      <p:sp>
+        <p:nvSpPr>
+          <p:cNvPr id="3" name="Content Placeholder 2">
+            <a:extLst>
+              <a:ext uri="{FF2B5EF4-FFF2-40B4-BE49-F238E27FC236}">
+                <a16:creationId xmlns:a16="http://schemas.microsoft.com/office/drawing/2014/main" id="{67951A7B-7617-9A2C-1BA6-F96C9B3EB19C}"/>
+              </a:ext>
+            </a:extLst>
+          </p:cNvPr>
+          <p:cNvSpPr>
+            <a:spLocks noGrp="1"/>
+          </p:cNvSpPr>
+          <p:nvPr>
+            <p:ph idx="1"/>
+          </p:nvPr>
+        </p:nvSpPr>
+        <p:spPr/>
+        <p:txBody>
+          <a:bodyPr/>
+          <a:lstStyle/>
+          <a:p>
+            <a:r>
+              <a:rPr lang="en-US" b="1" dirty="0"/>
+              <a:t>Limited Scope</a:t>
+            </a:r>
+            <a:r>
+              <a:rPr lang="en-US" dirty="0"/>
+              <a:t> – Most explainability methods focus only on </a:t>
+            </a:r>
+            <a:r>
+              <a:rPr lang="en-US" b="1" dirty="0"/>
+              <a:t>vision classification</a:t>
+            </a:r>
+            <a:r>
+              <a:rPr lang="en-US" dirty="0"/>
+              <a:t>, ignoring multi-modal understanding</a:t>
+            </a:r>
+          </a:p>
+          <a:p>
+            <a:r>
+              <a:rPr lang="en-US" b="1" dirty="0"/>
+              <a:t>Single-Model Focus</a:t>
+            </a:r>
+            <a:r>
+              <a:rPr lang="en-US" dirty="0"/>
+              <a:t> – Existing methods work with either </a:t>
+            </a:r>
+            <a:r>
+              <a:rPr lang="en-US" b="1" dirty="0"/>
+              <a:t>CNNs or Transformers</a:t>
+            </a:r>
+            <a:r>
+              <a:rPr lang="en-US" dirty="0"/>
+              <a:t>, but rarely both</a:t>
+            </a:r>
+          </a:p>
+          <a:p>
+            <a:r>
+              <a:rPr lang="en-US" b="1" dirty="0"/>
+              <a:t>Lack of Multi-Modal Explainability</a:t>
+            </a:r>
+            <a:r>
+              <a:rPr lang="en-US" dirty="0"/>
+              <a:t> – Current approaches fail to </a:t>
+            </a:r>
+            <a:r>
+              <a:rPr lang="en-US" b="1" dirty="0"/>
+              <a:t>link textual components with specific image regions</a:t>
+            </a:r>
+            <a:r>
+              <a:rPr lang="en-US" dirty="0"/>
+              <a:t> in vision-language models.</a:t>
+            </a:r>
+            <a:endParaRPr lang="en-IN" dirty="0"/>
+          </a:p>
+        </p:txBody>
+      </p:sp>
+      <p:pic>
+        <p:nvPicPr>
+          <p:cNvPr id="7" name="Picture 6">
+            <a:extLst>
+              <a:ext uri="{FF2B5EF4-FFF2-40B4-BE49-F238E27FC236}">
+                <a16:creationId xmlns:a16="http://schemas.microsoft.com/office/drawing/2014/main" id="{0D98C8F1-A43C-03DF-245D-8F5D0F211C88}"/>
+              </a:ext>
+            </a:extLst>
+          </p:cNvPr>
+          <p:cNvPicPr>
+            <a:picLocks noChangeAspect="1"/>
+          </p:cNvPicPr>
+          <p:nvPr/>
+        </p:nvPicPr>
+        <p:blipFill>
+          <a:blip r:embed="rId2">
+            <a:extLst>
+              <a:ext uri="{28A0092B-C50C-407E-A947-70E740481C1C}">
+                <a14:useLocalDpi xmlns:a14="http://schemas.microsoft.com/office/drawing/2010/main" val="0"/>
+              </a:ext>
+            </a:extLst>
+          </a:blip>
+          <a:stretch>
+            <a:fillRect/>
+          </a:stretch>
+        </p:blipFill>
+        <p:spPr>
+          <a:xfrm>
+            <a:off x="10094490" y="0"/>
+            <a:ext cx="1863300" cy="1050925"/>
+          </a:xfrm>
+          <a:prstGeom prst="rect">
+            <a:avLst/>
+          </a:prstGeom>
+        </p:spPr>
+      </p:pic>
+    </p:spTree>
+    <p:extLst>
+      <p:ext uri="{BB962C8B-B14F-4D97-AF65-F5344CB8AC3E}">
+        <p14:creationId xmlns:p14="http://schemas.microsoft.com/office/powerpoint/2010/main" val="445328935"/>
+      </p:ext>
+    </p:extLst>
+  </p:cSld>
+  <p:clrMapOvr>
+    <a:masterClrMapping/>
+  </p:clrMapOvr>
+</p:sld>
+</file>
+
+<file path=ppt/slides/slide11.xml><?xml version="1.0" encoding="utf-8"?>
+<p:sld xmlns:a="http://schemas.openxmlformats.org/drawingml/2006/main" xmlns:r="http://schemas.openxmlformats.org/officeDocument/2006/relationships" xmlns:p="http://schemas.openxmlformats.org/presentationml/2006/main">
+  <p:cSld>
+    <p:spTree>
+      <p:nvGrpSpPr>
+        <p:cNvPr id="1" name="">
+          <a:extLst>
+            <a:ext uri="{FF2B5EF4-FFF2-40B4-BE49-F238E27FC236}">
+              <a16:creationId xmlns:a16="http://schemas.microsoft.com/office/drawing/2014/main" id="{E1DB6C70-593D-AB9E-1CF1-F6C53C0F5D86}"/>
+            </a:ext>
+          </a:extLst>
+        </p:cNvPr>
+        <p:cNvGrpSpPr/>
+        <p:nvPr/>
+      </p:nvGrpSpPr>
+      <p:grpSpPr>
+        <a:xfrm>
+          <a:off x="0" y="0"/>
+          <a:ext cx="0" cy="0"/>
+          <a:chOff x="0" y="0"/>
+          <a:chExt cx="0" cy="0"/>
+        </a:xfrm>
+      </p:grpSpPr>
+      <p:sp>
+        <p:nvSpPr>
+          <p:cNvPr id="2" name="Title 1">
+            <a:extLst>
+              <a:ext uri="{FF2B5EF4-FFF2-40B4-BE49-F238E27FC236}">
+                <a16:creationId xmlns:a16="http://schemas.microsoft.com/office/drawing/2014/main" id="{93FD9F12-D16D-3F8C-0DE3-97C52D215940}"/>
+              </a:ext>
+            </a:extLst>
+          </p:cNvPr>
+          <p:cNvSpPr>
+            <a:spLocks noGrp="1"/>
+          </p:cNvSpPr>
+          <p:nvPr>
+            <p:ph type="title"/>
+          </p:nvPr>
+        </p:nvSpPr>
+        <p:spPr/>
+        <p:txBody>
+          <a:bodyPr/>
+          <a:lstStyle/>
+          <a:p>
+            <a:r>
+              <a:rPr lang="en-US" dirty="0"/>
+              <a:t>Objectives</a:t>
+            </a:r>
+            <a:endParaRPr lang="en-IN" dirty="0"/>
+          </a:p>
+        </p:txBody>
+      </p:sp>
+      <p:sp>
+        <p:nvSpPr>
+          <p:cNvPr id="3" name="Content Placeholder 2">
+            <a:extLst>
+              <a:ext uri="{FF2B5EF4-FFF2-40B4-BE49-F238E27FC236}">
+                <a16:creationId xmlns:a16="http://schemas.microsoft.com/office/drawing/2014/main" id="{0B6AE716-18BF-3DBC-80F7-A62B974D27F0}"/>
+              </a:ext>
+            </a:extLst>
+          </p:cNvPr>
+          <p:cNvSpPr>
+            <a:spLocks noGrp="1"/>
+          </p:cNvSpPr>
+          <p:nvPr>
+            <p:ph idx="1"/>
+          </p:nvPr>
+        </p:nvSpPr>
+        <p:spPr/>
+        <p:txBody>
+          <a:bodyPr/>
+          <a:lstStyle/>
+          <a:p>
+            <a:r>
+              <a:rPr lang="en-US" b="1" dirty="0"/>
+              <a:t>Develop a Novel Explainability Framework</a:t>
+            </a:r>
+            <a:r>
+              <a:rPr lang="en-US" dirty="0"/>
+              <a:t> – Design an approach that works for both </a:t>
+            </a:r>
+            <a:r>
+              <a:rPr lang="en-US" b="1" dirty="0"/>
+              <a:t>CNNs and Transformer-based models</a:t>
+            </a:r>
+            <a:r>
+              <a:rPr lang="en-US" dirty="0"/>
+              <a:t>.</a:t>
+            </a:r>
+          </a:p>
+          <a:p>
+            <a:r>
+              <a:rPr lang="en-US" b="1" dirty="0"/>
+              <a:t>Enable Multi-Modal Interpretation</a:t>
+            </a:r>
+            <a:r>
+              <a:rPr lang="en-US" dirty="0"/>
+              <a:t> – Provide insights into </a:t>
+            </a:r>
+            <a:r>
+              <a:rPr lang="en-US" b="1" dirty="0"/>
+              <a:t>text-image correlations</a:t>
+            </a:r>
+            <a:r>
+              <a:rPr lang="en-US" dirty="0"/>
+              <a:t> for tasks like </a:t>
+            </a:r>
+            <a:r>
+              <a:rPr lang="en-US" b="1" dirty="0"/>
+              <a:t>VQA and image captioning</a:t>
+            </a:r>
+            <a:r>
+              <a:rPr lang="en-US" dirty="0"/>
+              <a:t>.</a:t>
+            </a:r>
+          </a:p>
+          <a:p>
+            <a:r>
+              <a:rPr lang="en-US" b="1" dirty="0"/>
+              <a:t>Go Beyond Classification</a:t>
+            </a:r>
+            <a:r>
+              <a:rPr lang="en-US" dirty="0"/>
+              <a:t> – Extend explainability to </a:t>
+            </a:r>
+            <a:r>
+              <a:rPr lang="en-US" b="1" dirty="0"/>
+              <a:t>retrieval, segmentation, and multi-modal reasoning</a:t>
+            </a:r>
+            <a:r>
+              <a:rPr lang="en-US" dirty="0"/>
+              <a:t> tasks.</a:t>
+            </a:r>
+            <a:endParaRPr lang="en-IN" dirty="0"/>
+          </a:p>
+        </p:txBody>
+      </p:sp>
+      <p:pic>
+        <p:nvPicPr>
+          <p:cNvPr id="6" name="Picture 5">
+            <a:extLst>
+              <a:ext uri="{FF2B5EF4-FFF2-40B4-BE49-F238E27FC236}">
+                <a16:creationId xmlns:a16="http://schemas.microsoft.com/office/drawing/2014/main" id="{718070E0-B4E0-8682-FC8F-8AA6E59FAEE3}"/>
+              </a:ext>
+            </a:extLst>
+          </p:cNvPr>
+          <p:cNvPicPr>
+            <a:picLocks noChangeAspect="1"/>
+          </p:cNvPicPr>
+          <p:nvPr/>
+        </p:nvPicPr>
+        <p:blipFill>
+          <a:blip r:embed="rId2">
+            <a:extLst>
+              <a:ext uri="{28A0092B-C50C-407E-A947-70E740481C1C}">
+                <a14:useLocalDpi xmlns:a14="http://schemas.microsoft.com/office/drawing/2010/main" val="0"/>
+              </a:ext>
+            </a:extLst>
+          </a:blip>
+          <a:stretch>
+            <a:fillRect/>
+          </a:stretch>
+        </p:blipFill>
+        <p:spPr>
+          <a:xfrm>
+            <a:off x="10094490" y="0"/>
+            <a:ext cx="1863300" cy="1050925"/>
+          </a:xfrm>
+          <a:prstGeom prst="rect">
+            <a:avLst/>
+          </a:prstGeom>
+        </p:spPr>
+      </p:pic>
+    </p:spTree>
+    <p:extLst>
+      <p:ext uri="{BB962C8B-B14F-4D97-AF65-F5344CB8AC3E}">
+        <p14:creationId xmlns:p14="http://schemas.microsoft.com/office/powerpoint/2010/main" val="655096832"/>
+      </p:ext>
+    </p:extLst>
+  </p:cSld>
+  <p:clrMapOvr>
+    <a:masterClrMapping/>
+  </p:clrMapOvr>
+</p:sld>
+</file>
+
+<file path=ppt/slides/slide12.xml><?xml version="1.0" encoding="utf-8"?>
 <p:sld xmlns:a="http://schemas.openxmlformats.org/drawingml/2006/main" xmlns:r="http://schemas.openxmlformats.org/officeDocument/2006/relationships" xmlns:p="http://schemas.openxmlformats.org/presentationml/2006/main">
   <p:cSld>
     <p:spTree>
@@ -3848,7 +4219,7 @@
 </p:sld>
 </file>
 
-<file path=ppt/slides/slide11.xml><?xml version="1.0" encoding="utf-8"?>
+<file path=ppt/slides/slide13.xml><?xml version="1.0" encoding="utf-8"?>
 <p:sld xmlns:a="http://schemas.openxmlformats.org/drawingml/2006/main" xmlns:r="http://schemas.openxmlformats.org/officeDocument/2006/relationships" xmlns:p="http://schemas.openxmlformats.org/presentationml/2006/main">
   <p:cSld>
     <p:spTree>
@@ -4048,7 +4419,7 @@
 </p:sld>
 </file>
 
-<file path=ppt/slides/slide12.xml><?xml version="1.0" encoding="utf-8"?>
+<file path=ppt/slides/slide14.xml><?xml version="1.0" encoding="utf-8"?>
 <p:sld xmlns:a="http://schemas.openxmlformats.org/drawingml/2006/main" xmlns:r="http://schemas.openxmlformats.org/officeDocument/2006/relationships" xmlns:p="http://schemas.openxmlformats.org/presentationml/2006/main">
   <p:cSld>
     <p:spTree>
@@ -4249,7 +4620,7 @@
 </p:sld>
 </file>
 
-<file path=ppt/slides/slide13.xml><?xml version="1.0" encoding="utf-8"?>
+<file path=ppt/slides/slide15.xml><?xml version="1.0" encoding="utf-8"?>
 <p:sld xmlns:a="http://schemas.openxmlformats.org/drawingml/2006/main" xmlns:r="http://schemas.openxmlformats.org/officeDocument/2006/relationships" xmlns:p="http://schemas.openxmlformats.org/presentationml/2006/main">
   <p:cSld>
     <p:spTree>
@@ -7578,7 +7949,7 @@
         <p:cNvPr id="1" name="">
           <a:extLst>
             <a:ext uri="{FF2B5EF4-FFF2-40B4-BE49-F238E27FC236}">
-              <a16:creationId xmlns:a16="http://schemas.microsoft.com/office/drawing/2014/main" id="{C6D6722E-1583-8624-5283-A527A3E9BBB8}"/>
+              <a16:creationId xmlns:a16="http://schemas.microsoft.com/office/drawing/2014/main" id="{E85EB5E9-8031-D846-6B38-6FB314456D51}"/>
             </a:ext>
           </a:extLst>
         </p:cNvPr>
@@ -7598,7 +7969,7 @@
           <p:cNvPr id="2" name="Title 1">
             <a:extLst>
               <a:ext uri="{FF2B5EF4-FFF2-40B4-BE49-F238E27FC236}">
-                <a16:creationId xmlns:a16="http://schemas.microsoft.com/office/drawing/2014/main" id="{833743C6-5721-44BD-B121-40F746A02E19}"/>
+                <a16:creationId xmlns:a16="http://schemas.microsoft.com/office/drawing/2014/main" id="{30C54FAA-F88D-C59C-391D-1C67C067E8C3}"/>
               </a:ext>
             </a:extLst>
           </p:cNvPr>
@@ -7609,102 +7980,560 @@
             <p:ph type="title"/>
           </p:nvPr>
         </p:nvSpPr>
-        <p:spPr/>
+        <p:spPr>
+          <a:xfrm>
+            <a:off x="838200" y="365125"/>
+            <a:ext cx="10391778" cy="1325563"/>
+          </a:xfrm>
+        </p:spPr>
         <p:txBody>
           <a:bodyPr/>
           <a:lstStyle/>
           <a:p>
             <a:r>
               <a:rPr lang="en-US" dirty="0"/>
-              <a:t>Problem Statement</a:t>
+              <a:t>Literature Survey</a:t>
             </a:r>
             <a:endParaRPr lang="en-IN" dirty="0"/>
           </a:p>
         </p:txBody>
       </p:sp>
-      <p:sp>
-        <p:nvSpPr>
-          <p:cNvPr id="3" name="Content Placeholder 2">
+      <p:graphicFrame>
+        <p:nvGraphicFramePr>
+          <p:cNvPr id="10" name="Table 9">
             <a:extLst>
               <a:ext uri="{FF2B5EF4-FFF2-40B4-BE49-F238E27FC236}">
-                <a16:creationId xmlns:a16="http://schemas.microsoft.com/office/drawing/2014/main" id="{67951A7B-7617-9A2C-1BA6-F96C9B3EB19C}"/>
+                <a16:creationId xmlns:a16="http://schemas.microsoft.com/office/drawing/2014/main" id="{0593F3C3-90AD-4A19-7767-490F7229B463}"/>
               </a:ext>
             </a:extLst>
           </p:cNvPr>
-          <p:cNvSpPr>
-            <a:spLocks noGrp="1"/>
-          </p:cNvSpPr>
-          <p:nvPr>
-            <p:ph idx="1"/>
-          </p:nvPr>
-        </p:nvSpPr>
-        <p:spPr/>
-        <p:txBody>
-          <a:bodyPr/>
-          <a:lstStyle/>
-          <a:p>
-            <a:r>
-              <a:rPr lang="en-US" b="1" dirty="0"/>
-              <a:t>Limited Scope</a:t>
-            </a:r>
-            <a:r>
-              <a:rPr lang="en-US" dirty="0"/>
-              <a:t> – Most explainability methods focus only on </a:t>
-            </a:r>
-            <a:r>
-              <a:rPr lang="en-US" b="1" dirty="0"/>
-              <a:t>vision classification</a:t>
-            </a:r>
-            <a:r>
-              <a:rPr lang="en-US" dirty="0"/>
-              <a:t>, ignoring multi-modal understanding</a:t>
-            </a:r>
-          </a:p>
-          <a:p>
-            <a:r>
-              <a:rPr lang="en-US" b="1" dirty="0"/>
-              <a:t>Single-Model Focus</a:t>
-            </a:r>
-            <a:r>
-              <a:rPr lang="en-US" dirty="0"/>
-              <a:t> – Existing methods work with either </a:t>
-            </a:r>
-            <a:r>
-              <a:rPr lang="en-US" b="1" dirty="0"/>
-              <a:t>CNNs or Transformers</a:t>
-            </a:r>
-            <a:r>
-              <a:rPr lang="en-US" dirty="0"/>
-              <a:t>, but rarely both</a:t>
-            </a:r>
-          </a:p>
-          <a:p>
-            <a:r>
-              <a:rPr lang="en-US" b="1" dirty="0"/>
-              <a:t>Lack of Multi-Modal Explainability</a:t>
-            </a:r>
-            <a:r>
-              <a:rPr lang="en-US" dirty="0"/>
-              <a:t> – Current approaches fail to </a:t>
-            </a:r>
-            <a:r>
-              <a:rPr lang="en-US" b="1" dirty="0"/>
-              <a:t>link textual components with specific image regions</a:t>
-            </a:r>
-            <a:r>
-              <a:rPr lang="en-US" dirty="0"/>
-              <a:t> in vision-language models.</a:t>
-            </a:r>
-            <a:endParaRPr lang="en-IN" dirty="0"/>
-          </a:p>
-        </p:txBody>
-      </p:sp>
+          <p:cNvGraphicFramePr>
+            <a:graphicFrameLocks noGrp="1"/>
+          </p:cNvGraphicFramePr>
+          <p:nvPr>
+            <p:extLst>
+              <p:ext uri="{D42A27DB-BD31-4B8C-83A1-F6EECF244321}">
+                <p14:modId xmlns:p14="http://schemas.microsoft.com/office/powerpoint/2010/main" val="3226721355"/>
+              </p:ext>
+            </p:extLst>
+          </p:nvPr>
+        </p:nvGraphicFramePr>
+        <p:xfrm>
+          <a:off x="962020" y="1310216"/>
+          <a:ext cx="10391780" cy="4059557"/>
+        </p:xfrm>
+        <a:graphic>
+          <a:graphicData uri="http://schemas.openxmlformats.org/drawingml/2006/table">
+            <a:tbl>
+              <a:tblPr firstRow="1" bandRow="1">
+                <a:tableStyleId>{5C22544A-7EE6-4342-B048-85BDC9FD1C3A}</a:tableStyleId>
+              </a:tblPr>
+              <a:tblGrid>
+                <a:gridCol w="914400">
+                  <a:extLst>
+                    <a:ext uri="{9D8B030D-6E8A-4147-A177-3AD203B41FA5}">
+                      <a16:colId xmlns:a16="http://schemas.microsoft.com/office/drawing/2014/main" val="3999095857"/>
+                    </a:ext>
+                  </a:extLst>
+                </a:gridCol>
+                <a:gridCol w="1266825">
+                  <a:extLst>
+                    <a:ext uri="{9D8B030D-6E8A-4147-A177-3AD203B41FA5}">
+                      <a16:colId xmlns:a16="http://schemas.microsoft.com/office/drawing/2014/main" val="218132091"/>
+                    </a:ext>
+                  </a:extLst>
+                </a:gridCol>
+                <a:gridCol w="1295400">
+                  <a:extLst>
+                    <a:ext uri="{9D8B030D-6E8A-4147-A177-3AD203B41FA5}">
+                      <a16:colId xmlns:a16="http://schemas.microsoft.com/office/drawing/2014/main" val="189629736"/>
+                    </a:ext>
+                  </a:extLst>
+                </a:gridCol>
+                <a:gridCol w="1704975">
+                  <a:extLst>
+                    <a:ext uri="{9D8B030D-6E8A-4147-A177-3AD203B41FA5}">
+                      <a16:colId xmlns:a16="http://schemas.microsoft.com/office/drawing/2014/main" val="3190891163"/>
+                    </a:ext>
+                  </a:extLst>
+                </a:gridCol>
+                <a:gridCol w="1743075">
+                  <a:extLst>
+                    <a:ext uri="{9D8B030D-6E8A-4147-A177-3AD203B41FA5}">
+                      <a16:colId xmlns:a16="http://schemas.microsoft.com/office/drawing/2014/main" val="33616868"/>
+                    </a:ext>
+                  </a:extLst>
+                </a:gridCol>
+                <a:gridCol w="1504950">
+                  <a:extLst>
+                    <a:ext uri="{9D8B030D-6E8A-4147-A177-3AD203B41FA5}">
+                      <a16:colId xmlns:a16="http://schemas.microsoft.com/office/drawing/2014/main" val="2863264942"/>
+                    </a:ext>
+                  </a:extLst>
+                </a:gridCol>
+                <a:gridCol w="1962155">
+                  <a:extLst>
+                    <a:ext uri="{9D8B030D-6E8A-4147-A177-3AD203B41FA5}">
+                      <a16:colId xmlns:a16="http://schemas.microsoft.com/office/drawing/2014/main" val="417061360"/>
+                    </a:ext>
+                  </a:extLst>
+                </a:gridCol>
+              </a:tblGrid>
+              <a:tr h="566209">
+                <a:tc>
+                  <a:txBody>
+                    <a:bodyPr/>
+                    <a:lstStyle/>
+                    <a:p>
+                      <a:r>
+                        <a:rPr lang="en-US" dirty="0"/>
+                        <a:t>Sr No </a:t>
+                      </a:r>
+                      <a:endParaRPr lang="en-IN" dirty="0"/>
+                    </a:p>
+                  </a:txBody>
+                  <a:tcPr/>
+                </a:tc>
+                <a:tc>
+                  <a:txBody>
+                    <a:bodyPr/>
+                    <a:lstStyle/>
+                    <a:p>
+                      <a:r>
+                        <a:rPr lang="en-US" dirty="0"/>
+                        <a:t>Method </a:t>
+                      </a:r>
+                      <a:endParaRPr lang="en-IN" dirty="0"/>
+                    </a:p>
+                  </a:txBody>
+                  <a:tcPr/>
+                </a:tc>
+                <a:tc>
+                  <a:txBody>
+                    <a:bodyPr/>
+                    <a:lstStyle/>
+                    <a:p>
+                      <a:r>
+                        <a:rPr lang="en-US" dirty="0"/>
+                        <a:t>Category</a:t>
+                      </a:r>
+                      <a:endParaRPr lang="en-IN" dirty="0"/>
+                    </a:p>
+                  </a:txBody>
+                  <a:tcPr/>
+                </a:tc>
+                <a:tc>
+                  <a:txBody>
+                    <a:bodyPr/>
+                    <a:lstStyle/>
+                    <a:p>
+                      <a:r>
+                        <a:rPr lang="en-US" dirty="0"/>
+                        <a:t>Dataset</a:t>
+                      </a:r>
+                      <a:endParaRPr lang="en-IN" dirty="0"/>
+                    </a:p>
+                  </a:txBody>
+                  <a:tcPr/>
+                </a:tc>
+                <a:tc>
+                  <a:txBody>
+                    <a:bodyPr/>
+                    <a:lstStyle/>
+                    <a:p>
+                      <a:r>
+                        <a:rPr lang="en-US" dirty="0"/>
+                        <a:t>Model</a:t>
+                      </a:r>
+                      <a:endParaRPr lang="en-IN" dirty="0"/>
+                    </a:p>
+                  </a:txBody>
+                  <a:tcPr/>
+                </a:tc>
+                <a:tc>
+                  <a:txBody>
+                    <a:bodyPr/>
+                    <a:lstStyle/>
+                    <a:p>
+                      <a:r>
+                        <a:rPr lang="en-US" dirty="0"/>
+                        <a:t>Task</a:t>
+                      </a:r>
+                      <a:endParaRPr lang="en-IN" dirty="0"/>
+                    </a:p>
+                  </a:txBody>
+                  <a:tcPr/>
+                </a:tc>
+                <a:tc>
+                  <a:txBody>
+                    <a:bodyPr/>
+                    <a:lstStyle/>
+                    <a:p>
+                      <a:r>
+                        <a:rPr lang="en-US" dirty="0"/>
+                        <a:t>Information</a:t>
+                      </a:r>
+                      <a:endParaRPr lang="en-IN" dirty="0"/>
+                    </a:p>
+                  </a:txBody>
+                  <a:tcPr/>
+                </a:tc>
+                <a:extLst>
+                  <a:ext uri="{0D108BD9-81ED-4DB2-BD59-A6C34878D82A}">
+                    <a16:rowId xmlns:a16="http://schemas.microsoft.com/office/drawing/2014/main" val="1236473839"/>
+                  </a:ext>
+                </a:extLst>
+              </a:tr>
+              <a:tr h="873337">
+                <a:tc>
+                  <a:txBody>
+                    <a:bodyPr/>
+                    <a:lstStyle/>
+                    <a:p>
+                      <a:r>
+                        <a:rPr lang="en-US" dirty="0"/>
+                        <a:t>17</a:t>
+                      </a:r>
+                      <a:endParaRPr lang="en-IN" dirty="0"/>
+                    </a:p>
+                  </a:txBody>
+                  <a:tcPr/>
+                </a:tc>
+                <a:tc>
+                  <a:txBody>
+                    <a:bodyPr/>
+                    <a:lstStyle/>
+                    <a:p>
+                      <a:r>
+                        <a:rPr lang="en-US" dirty="0"/>
+                        <a:t>CLIP</a:t>
+                      </a:r>
+                      <a:endParaRPr lang="en-IN" dirty="0"/>
+                    </a:p>
+                  </a:txBody>
+                  <a:tcPr/>
+                </a:tc>
+                <a:tc>
+                  <a:txBody>
+                    <a:bodyPr/>
+                    <a:lstStyle/>
+                    <a:p>
+                      <a:endParaRPr lang="en-IN" dirty="0"/>
+                    </a:p>
+                  </a:txBody>
+                  <a:tcPr/>
+                </a:tc>
+                <a:tc>
+                  <a:txBody>
+                    <a:bodyPr/>
+                    <a:lstStyle/>
+                    <a:p>
+                      <a:endParaRPr lang="en-IN" dirty="0"/>
+                    </a:p>
+                  </a:txBody>
+                  <a:tcPr/>
+                </a:tc>
+                <a:tc>
+                  <a:txBody>
+                    <a:bodyPr/>
+                    <a:lstStyle/>
+                    <a:p>
+                      <a:endParaRPr lang="en-IN" dirty="0"/>
+                    </a:p>
+                  </a:txBody>
+                  <a:tcPr/>
+                </a:tc>
+                <a:tc>
+                  <a:txBody>
+                    <a:bodyPr/>
+                    <a:lstStyle/>
+                    <a:p>
+                      <a:endParaRPr lang="en-IN" dirty="0"/>
+                    </a:p>
+                  </a:txBody>
+                  <a:tcPr/>
+                </a:tc>
+                <a:tc>
+                  <a:txBody>
+                    <a:bodyPr/>
+                    <a:lstStyle/>
+                    <a:p>
+                      <a:endParaRPr lang="en-IN" dirty="0"/>
+                    </a:p>
+                  </a:txBody>
+                  <a:tcPr/>
+                </a:tc>
+                <a:extLst>
+                  <a:ext uri="{0D108BD9-81ED-4DB2-BD59-A6C34878D82A}">
+                    <a16:rowId xmlns:a16="http://schemas.microsoft.com/office/drawing/2014/main" val="1877996509"/>
+                  </a:ext>
+                </a:extLst>
+              </a:tr>
+              <a:tr h="873337">
+                <a:tc>
+                  <a:txBody>
+                    <a:bodyPr/>
+                    <a:lstStyle/>
+                    <a:p>
+                      <a:r>
+                        <a:rPr lang="en-US" dirty="0"/>
+                        <a:t>18</a:t>
+                      </a:r>
+                      <a:endParaRPr lang="en-IN" dirty="0"/>
+                    </a:p>
+                  </a:txBody>
+                  <a:tcPr/>
+                </a:tc>
+                <a:tc>
+                  <a:txBody>
+                    <a:bodyPr/>
+                    <a:lstStyle/>
+                    <a:p>
+                      <a:r>
+                        <a:rPr lang="en-US" dirty="0"/>
+                        <a:t>SHAP-CAT</a:t>
+                      </a:r>
+                      <a:endParaRPr lang="en-IN" dirty="0"/>
+                    </a:p>
+                  </a:txBody>
+                  <a:tcPr/>
+                </a:tc>
+                <a:tc>
+                  <a:txBody>
+                    <a:bodyPr/>
+                    <a:lstStyle/>
+                    <a:p>
+                      <a:endParaRPr lang="en-IN" dirty="0"/>
+                    </a:p>
+                  </a:txBody>
+                  <a:tcPr/>
+                </a:tc>
+                <a:tc>
+                  <a:txBody>
+                    <a:bodyPr/>
+                    <a:lstStyle/>
+                    <a:p>
+                      <a:endParaRPr lang="en-IN" dirty="0"/>
+                    </a:p>
+                  </a:txBody>
+                  <a:tcPr/>
+                </a:tc>
+                <a:tc>
+                  <a:txBody>
+                    <a:bodyPr/>
+                    <a:lstStyle/>
+                    <a:p>
+                      <a:endParaRPr lang="en-IN" dirty="0"/>
+                    </a:p>
+                  </a:txBody>
+                  <a:tcPr/>
+                </a:tc>
+                <a:tc>
+                  <a:txBody>
+                    <a:bodyPr/>
+                    <a:lstStyle/>
+                    <a:p>
+                      <a:endParaRPr lang="en-IN" dirty="0"/>
+                    </a:p>
+                  </a:txBody>
+                  <a:tcPr/>
+                </a:tc>
+                <a:tc>
+                  <a:txBody>
+                    <a:bodyPr/>
+                    <a:lstStyle/>
+                    <a:p>
+                      <a:endParaRPr lang="en-IN" dirty="0"/>
+                    </a:p>
+                  </a:txBody>
+                  <a:tcPr/>
+                </a:tc>
+                <a:extLst>
+                  <a:ext uri="{0D108BD9-81ED-4DB2-BD59-A6C34878D82A}">
+                    <a16:rowId xmlns:a16="http://schemas.microsoft.com/office/drawing/2014/main" val="2493072846"/>
+                  </a:ext>
+                </a:extLst>
+              </a:tr>
+              <a:tr h="873337">
+                <a:tc>
+                  <a:txBody>
+                    <a:bodyPr/>
+                    <a:lstStyle/>
+                    <a:p>
+                      <a:r>
+                        <a:rPr lang="en-US" dirty="0"/>
+                        <a:t>19</a:t>
+                      </a:r>
+                      <a:endParaRPr lang="en-IN" dirty="0"/>
+                    </a:p>
+                  </a:txBody>
+                  <a:tcPr/>
+                </a:tc>
+                <a:tc>
+                  <a:txBody>
+                    <a:bodyPr/>
+                    <a:lstStyle/>
+                    <a:p>
+                      <a:r>
+                        <a:rPr lang="en-US" dirty="0"/>
+                        <a:t>Grounding DINO</a:t>
+                      </a:r>
+                      <a:endParaRPr lang="en-IN" dirty="0"/>
+                    </a:p>
+                  </a:txBody>
+                  <a:tcPr/>
+                </a:tc>
+                <a:tc>
+                  <a:txBody>
+                    <a:bodyPr/>
+                    <a:lstStyle/>
+                    <a:p>
+                      <a:endParaRPr lang="en-IN" dirty="0"/>
+                    </a:p>
+                  </a:txBody>
+                  <a:tcPr/>
+                </a:tc>
+                <a:tc>
+                  <a:txBody>
+                    <a:bodyPr/>
+                    <a:lstStyle/>
+                    <a:p>
+                      <a:endParaRPr lang="en-IN" dirty="0"/>
+                    </a:p>
+                  </a:txBody>
+                  <a:tcPr/>
+                </a:tc>
+                <a:tc>
+                  <a:txBody>
+                    <a:bodyPr/>
+                    <a:lstStyle/>
+                    <a:p>
+                      <a:endParaRPr lang="en-IN" dirty="0"/>
+                    </a:p>
+                  </a:txBody>
+                  <a:tcPr/>
+                </a:tc>
+                <a:tc>
+                  <a:txBody>
+                    <a:bodyPr/>
+                    <a:lstStyle/>
+                    <a:p>
+                      <a:endParaRPr lang="en-IN" dirty="0"/>
+                    </a:p>
+                  </a:txBody>
+                  <a:tcPr/>
+                </a:tc>
+                <a:tc>
+                  <a:txBody>
+                    <a:bodyPr/>
+                    <a:lstStyle/>
+                    <a:p>
+                      <a:endParaRPr lang="en-IN" dirty="0"/>
+                    </a:p>
+                  </a:txBody>
+                  <a:tcPr/>
+                </a:tc>
+                <a:extLst>
+                  <a:ext uri="{0D108BD9-81ED-4DB2-BD59-A6C34878D82A}">
+                    <a16:rowId xmlns:a16="http://schemas.microsoft.com/office/drawing/2014/main" val="2907816467"/>
+                  </a:ext>
+                </a:extLst>
+              </a:tr>
+              <a:tr h="873337">
+                <a:tc>
+                  <a:txBody>
+                    <a:bodyPr/>
+                    <a:lstStyle/>
+                    <a:p>
+                      <a:r>
+                        <a:rPr lang="en-US" dirty="0"/>
+                        <a:t>20</a:t>
+                      </a:r>
+                      <a:endParaRPr lang="en-IN" dirty="0"/>
+                    </a:p>
+                  </a:txBody>
+                  <a:tcPr/>
+                </a:tc>
+                <a:tc>
+                  <a:txBody>
+                    <a:bodyPr/>
+                    <a:lstStyle/>
+                    <a:p>
+                      <a:r>
+                        <a:rPr lang="en-US" dirty="0"/>
+                        <a:t>ICEv2</a:t>
+                      </a:r>
+                      <a:endParaRPr lang="en-IN" dirty="0"/>
+                    </a:p>
+                  </a:txBody>
+                  <a:tcPr/>
+                </a:tc>
+                <a:tc>
+                  <a:txBody>
+                    <a:bodyPr/>
+                    <a:lstStyle/>
+                    <a:p>
+                      <a:endParaRPr lang="en-IN" dirty="0"/>
+                    </a:p>
+                  </a:txBody>
+                  <a:tcPr/>
+                </a:tc>
+                <a:tc>
+                  <a:txBody>
+                    <a:bodyPr/>
+                    <a:lstStyle/>
+                    <a:p>
+                      <a:endParaRPr lang="en-IN" dirty="0"/>
+                    </a:p>
+                  </a:txBody>
+                  <a:tcPr/>
+                </a:tc>
+                <a:tc>
+                  <a:txBody>
+                    <a:bodyPr/>
+                    <a:lstStyle/>
+                    <a:p>
+                      <a:endParaRPr lang="en-IN" dirty="0"/>
+                    </a:p>
+                  </a:txBody>
+                  <a:tcPr/>
+                </a:tc>
+                <a:tc>
+                  <a:txBody>
+                    <a:bodyPr/>
+                    <a:lstStyle/>
+                    <a:p>
+                      <a:endParaRPr lang="en-IN" dirty="0"/>
+                    </a:p>
+                  </a:txBody>
+                  <a:tcPr/>
+                </a:tc>
+                <a:tc>
+                  <a:txBody>
+                    <a:bodyPr/>
+                    <a:lstStyle/>
+                    <a:p>
+                      <a:endParaRPr lang="en-IN" dirty="0"/>
+                    </a:p>
+                  </a:txBody>
+                  <a:tcPr/>
+                </a:tc>
+                <a:extLst>
+                  <a:ext uri="{0D108BD9-81ED-4DB2-BD59-A6C34878D82A}">
+                    <a16:rowId xmlns:a16="http://schemas.microsoft.com/office/drawing/2014/main" val="3748464164"/>
+                  </a:ext>
+                </a:extLst>
+              </a:tr>
+            </a:tbl>
+          </a:graphicData>
+        </a:graphic>
+      </p:graphicFrame>
       <p:pic>
         <p:nvPicPr>
-          <p:cNvPr id="7" name="Picture 6">
+          <p:cNvPr id="5" name="Picture 4">
             <a:extLst>
               <a:ext uri="{FF2B5EF4-FFF2-40B4-BE49-F238E27FC236}">
-                <a16:creationId xmlns:a16="http://schemas.microsoft.com/office/drawing/2014/main" id="{0D98C8F1-A43C-03DF-245D-8F5D0F211C88}"/>
+                <a16:creationId xmlns:a16="http://schemas.microsoft.com/office/drawing/2014/main" id="{893D0B92-DE34-E120-69EB-98041161635E}"/>
               </a:ext>
             </a:extLst>
           </p:cNvPr>
@@ -7738,7 +8567,7 @@
     </p:spTree>
     <p:extLst>
       <p:ext uri="{BB962C8B-B14F-4D97-AF65-F5344CB8AC3E}">
-        <p14:creationId xmlns:p14="http://schemas.microsoft.com/office/powerpoint/2010/main" val="445328935"/>
+        <p14:creationId xmlns:p14="http://schemas.microsoft.com/office/powerpoint/2010/main" val="692730610"/>
       </p:ext>
     </p:extLst>
   </p:cSld>
@@ -7756,7 +8585,7 @@
         <p:cNvPr id="1" name="">
           <a:extLst>
             <a:ext uri="{FF2B5EF4-FFF2-40B4-BE49-F238E27FC236}">
-              <a16:creationId xmlns:a16="http://schemas.microsoft.com/office/drawing/2014/main" id="{E1DB6C70-593D-AB9E-1CF1-F6C53C0F5D86}"/>
+              <a16:creationId xmlns:a16="http://schemas.microsoft.com/office/drawing/2014/main" id="{64F44206-D055-3FAC-C960-17EEFD2EEF3B}"/>
             </a:ext>
           </a:extLst>
         </p:cNvPr>
@@ -7776,7 +8605,7 @@
           <p:cNvPr id="2" name="Title 1">
             <a:extLst>
               <a:ext uri="{FF2B5EF4-FFF2-40B4-BE49-F238E27FC236}">
-                <a16:creationId xmlns:a16="http://schemas.microsoft.com/office/drawing/2014/main" id="{93FD9F12-D16D-3F8C-0DE3-97C52D215940}"/>
+                <a16:creationId xmlns:a16="http://schemas.microsoft.com/office/drawing/2014/main" id="{AE97C939-5403-508E-0DBA-B92FBC22A91F}"/>
               </a:ext>
             </a:extLst>
           </p:cNvPr>
@@ -7787,110 +8616,552 @@
             <p:ph type="title"/>
           </p:nvPr>
         </p:nvSpPr>
-        <p:spPr/>
+        <p:spPr>
+          <a:xfrm>
+            <a:off x="838200" y="365125"/>
+            <a:ext cx="10391778" cy="1325563"/>
+          </a:xfrm>
+        </p:spPr>
         <p:txBody>
           <a:bodyPr/>
           <a:lstStyle/>
           <a:p>
             <a:r>
               <a:rPr lang="en-US" dirty="0"/>
-              <a:t>Objectives</a:t>
+              <a:t>Literature Survey</a:t>
             </a:r>
             <a:endParaRPr lang="en-IN" dirty="0"/>
           </a:p>
         </p:txBody>
       </p:sp>
-      <p:sp>
-        <p:nvSpPr>
-          <p:cNvPr id="3" name="Content Placeholder 2">
+      <p:graphicFrame>
+        <p:nvGraphicFramePr>
+          <p:cNvPr id="10" name="Table 9">
             <a:extLst>
               <a:ext uri="{FF2B5EF4-FFF2-40B4-BE49-F238E27FC236}">
-                <a16:creationId xmlns:a16="http://schemas.microsoft.com/office/drawing/2014/main" id="{0B6AE716-18BF-3DBC-80F7-A62B974D27F0}"/>
+                <a16:creationId xmlns:a16="http://schemas.microsoft.com/office/drawing/2014/main" id="{7B6AA826-8691-A8EA-5AB6-66D98FDB6A71}"/>
               </a:ext>
             </a:extLst>
           </p:cNvPr>
-          <p:cNvSpPr>
-            <a:spLocks noGrp="1"/>
-          </p:cNvSpPr>
-          <p:nvPr>
-            <p:ph idx="1"/>
-          </p:nvPr>
-        </p:nvSpPr>
-        <p:spPr/>
-        <p:txBody>
-          <a:bodyPr/>
-          <a:lstStyle/>
-          <a:p>
-            <a:r>
-              <a:rPr lang="en-US" b="1" dirty="0"/>
-              <a:t>Develop a Novel Explainability Framework</a:t>
-            </a:r>
-            <a:r>
-              <a:rPr lang="en-US" dirty="0"/>
-              <a:t> – Design an approach that works for both </a:t>
-            </a:r>
-            <a:r>
-              <a:rPr lang="en-US" b="1" dirty="0"/>
-              <a:t>CNNs and Transformer-based models</a:t>
-            </a:r>
-            <a:r>
-              <a:rPr lang="en-US" dirty="0"/>
-              <a:t>.</a:t>
-            </a:r>
-          </a:p>
-          <a:p>
-            <a:r>
-              <a:rPr lang="en-US" b="1" dirty="0"/>
-              <a:t>Enable Multi-Modal Interpretation</a:t>
-            </a:r>
-            <a:r>
-              <a:rPr lang="en-US" dirty="0"/>
-              <a:t> – Provide insights into </a:t>
-            </a:r>
-            <a:r>
-              <a:rPr lang="en-US" b="1" dirty="0"/>
-              <a:t>text-image correlations</a:t>
-            </a:r>
-            <a:r>
-              <a:rPr lang="en-US" dirty="0"/>
-              <a:t> for tasks like </a:t>
-            </a:r>
-            <a:r>
-              <a:rPr lang="en-US" b="1" dirty="0"/>
-              <a:t>VQA and image captioning</a:t>
-            </a:r>
-            <a:r>
-              <a:rPr lang="en-US" dirty="0"/>
-              <a:t>.</a:t>
-            </a:r>
-          </a:p>
-          <a:p>
-            <a:r>
-              <a:rPr lang="en-US" b="1" dirty="0"/>
-              <a:t>Go Beyond Classification</a:t>
-            </a:r>
-            <a:r>
-              <a:rPr lang="en-US" dirty="0"/>
-              <a:t> – Extend explainability to </a:t>
-            </a:r>
-            <a:r>
-              <a:rPr lang="en-US" b="1" dirty="0"/>
-              <a:t>retrieval, segmentation, and multi-modal reasoning</a:t>
-            </a:r>
-            <a:r>
-              <a:rPr lang="en-US" dirty="0"/>
-              <a:t> tasks.</a:t>
-            </a:r>
-            <a:endParaRPr lang="en-IN" dirty="0"/>
-          </a:p>
-        </p:txBody>
-      </p:sp>
+          <p:cNvGraphicFramePr>
+            <a:graphicFrameLocks noGrp="1"/>
+          </p:cNvGraphicFramePr>
+          <p:nvPr>
+            <p:extLst>
+              <p:ext uri="{D42A27DB-BD31-4B8C-83A1-F6EECF244321}">
+                <p14:modId xmlns:p14="http://schemas.microsoft.com/office/powerpoint/2010/main" val="1311776797"/>
+              </p:ext>
+            </p:extLst>
+          </p:nvPr>
+        </p:nvGraphicFramePr>
+        <p:xfrm>
+          <a:off x="962020" y="1310216"/>
+          <a:ext cx="10391780" cy="4059557"/>
+        </p:xfrm>
+        <a:graphic>
+          <a:graphicData uri="http://schemas.openxmlformats.org/drawingml/2006/table">
+            <a:tbl>
+              <a:tblPr firstRow="1" bandRow="1">
+                <a:tableStyleId>{5C22544A-7EE6-4342-B048-85BDC9FD1C3A}</a:tableStyleId>
+              </a:tblPr>
+              <a:tblGrid>
+                <a:gridCol w="914400">
+                  <a:extLst>
+                    <a:ext uri="{9D8B030D-6E8A-4147-A177-3AD203B41FA5}">
+                      <a16:colId xmlns:a16="http://schemas.microsoft.com/office/drawing/2014/main" val="3999095857"/>
+                    </a:ext>
+                  </a:extLst>
+                </a:gridCol>
+                <a:gridCol w="1266825">
+                  <a:extLst>
+                    <a:ext uri="{9D8B030D-6E8A-4147-A177-3AD203B41FA5}">
+                      <a16:colId xmlns:a16="http://schemas.microsoft.com/office/drawing/2014/main" val="218132091"/>
+                    </a:ext>
+                  </a:extLst>
+                </a:gridCol>
+                <a:gridCol w="1295400">
+                  <a:extLst>
+                    <a:ext uri="{9D8B030D-6E8A-4147-A177-3AD203B41FA5}">
+                      <a16:colId xmlns:a16="http://schemas.microsoft.com/office/drawing/2014/main" val="189629736"/>
+                    </a:ext>
+                  </a:extLst>
+                </a:gridCol>
+                <a:gridCol w="1704975">
+                  <a:extLst>
+                    <a:ext uri="{9D8B030D-6E8A-4147-A177-3AD203B41FA5}">
+                      <a16:colId xmlns:a16="http://schemas.microsoft.com/office/drawing/2014/main" val="3190891163"/>
+                    </a:ext>
+                  </a:extLst>
+                </a:gridCol>
+                <a:gridCol w="1743075">
+                  <a:extLst>
+                    <a:ext uri="{9D8B030D-6E8A-4147-A177-3AD203B41FA5}">
+                      <a16:colId xmlns:a16="http://schemas.microsoft.com/office/drawing/2014/main" val="33616868"/>
+                    </a:ext>
+                  </a:extLst>
+                </a:gridCol>
+                <a:gridCol w="1504950">
+                  <a:extLst>
+                    <a:ext uri="{9D8B030D-6E8A-4147-A177-3AD203B41FA5}">
+                      <a16:colId xmlns:a16="http://schemas.microsoft.com/office/drawing/2014/main" val="2863264942"/>
+                    </a:ext>
+                  </a:extLst>
+                </a:gridCol>
+                <a:gridCol w="1962155">
+                  <a:extLst>
+                    <a:ext uri="{9D8B030D-6E8A-4147-A177-3AD203B41FA5}">
+                      <a16:colId xmlns:a16="http://schemas.microsoft.com/office/drawing/2014/main" val="417061360"/>
+                    </a:ext>
+                  </a:extLst>
+                </a:gridCol>
+              </a:tblGrid>
+              <a:tr h="566209">
+                <a:tc>
+                  <a:txBody>
+                    <a:bodyPr/>
+                    <a:lstStyle/>
+                    <a:p>
+                      <a:r>
+                        <a:rPr lang="en-US" dirty="0"/>
+                        <a:t>Sr No </a:t>
+                      </a:r>
+                      <a:endParaRPr lang="en-IN" dirty="0"/>
+                    </a:p>
+                  </a:txBody>
+                  <a:tcPr/>
+                </a:tc>
+                <a:tc>
+                  <a:txBody>
+                    <a:bodyPr/>
+                    <a:lstStyle/>
+                    <a:p>
+                      <a:r>
+                        <a:rPr lang="en-US" dirty="0"/>
+                        <a:t>Method </a:t>
+                      </a:r>
+                      <a:endParaRPr lang="en-IN" dirty="0"/>
+                    </a:p>
+                  </a:txBody>
+                  <a:tcPr/>
+                </a:tc>
+                <a:tc>
+                  <a:txBody>
+                    <a:bodyPr/>
+                    <a:lstStyle/>
+                    <a:p>
+                      <a:r>
+                        <a:rPr lang="en-US" dirty="0"/>
+                        <a:t>Category</a:t>
+                      </a:r>
+                      <a:endParaRPr lang="en-IN" dirty="0"/>
+                    </a:p>
+                  </a:txBody>
+                  <a:tcPr/>
+                </a:tc>
+                <a:tc>
+                  <a:txBody>
+                    <a:bodyPr/>
+                    <a:lstStyle/>
+                    <a:p>
+                      <a:r>
+                        <a:rPr lang="en-US" dirty="0"/>
+                        <a:t>Dataset</a:t>
+                      </a:r>
+                      <a:endParaRPr lang="en-IN" dirty="0"/>
+                    </a:p>
+                  </a:txBody>
+                  <a:tcPr/>
+                </a:tc>
+                <a:tc>
+                  <a:txBody>
+                    <a:bodyPr/>
+                    <a:lstStyle/>
+                    <a:p>
+                      <a:r>
+                        <a:rPr lang="en-US" dirty="0"/>
+                        <a:t>Model</a:t>
+                      </a:r>
+                      <a:endParaRPr lang="en-IN" dirty="0"/>
+                    </a:p>
+                  </a:txBody>
+                  <a:tcPr/>
+                </a:tc>
+                <a:tc>
+                  <a:txBody>
+                    <a:bodyPr/>
+                    <a:lstStyle/>
+                    <a:p>
+                      <a:r>
+                        <a:rPr lang="en-US" dirty="0"/>
+                        <a:t>Task</a:t>
+                      </a:r>
+                      <a:endParaRPr lang="en-IN" dirty="0"/>
+                    </a:p>
+                  </a:txBody>
+                  <a:tcPr/>
+                </a:tc>
+                <a:tc>
+                  <a:txBody>
+                    <a:bodyPr/>
+                    <a:lstStyle/>
+                    <a:p>
+                      <a:r>
+                        <a:rPr lang="en-US" dirty="0"/>
+                        <a:t>Information</a:t>
+                      </a:r>
+                      <a:endParaRPr lang="en-IN" dirty="0"/>
+                    </a:p>
+                  </a:txBody>
+                  <a:tcPr/>
+                </a:tc>
+                <a:extLst>
+                  <a:ext uri="{0D108BD9-81ED-4DB2-BD59-A6C34878D82A}">
+                    <a16:rowId xmlns:a16="http://schemas.microsoft.com/office/drawing/2014/main" val="1236473839"/>
+                  </a:ext>
+                </a:extLst>
+              </a:tr>
+              <a:tr h="873337">
+                <a:tc>
+                  <a:txBody>
+                    <a:bodyPr/>
+                    <a:lstStyle/>
+                    <a:p>
+                      <a:r>
+                        <a:rPr lang="en-US" dirty="0"/>
+                        <a:t>21</a:t>
+                      </a:r>
+                      <a:endParaRPr lang="en-IN" dirty="0"/>
+                    </a:p>
+                  </a:txBody>
+                  <a:tcPr/>
+                </a:tc>
+                <a:tc>
+                  <a:txBody>
+                    <a:bodyPr/>
+                    <a:lstStyle/>
+                    <a:p>
+                      <a:r>
+                        <a:rPr lang="en-US" dirty="0"/>
+                        <a:t>3VL</a:t>
+                      </a:r>
+                      <a:endParaRPr lang="en-IN" dirty="0"/>
+                    </a:p>
+                  </a:txBody>
+                  <a:tcPr/>
+                </a:tc>
+                <a:tc>
+                  <a:txBody>
+                    <a:bodyPr/>
+                    <a:lstStyle/>
+                    <a:p>
+                      <a:endParaRPr lang="en-IN" dirty="0"/>
+                    </a:p>
+                  </a:txBody>
+                  <a:tcPr/>
+                </a:tc>
+                <a:tc>
+                  <a:txBody>
+                    <a:bodyPr/>
+                    <a:lstStyle/>
+                    <a:p>
+                      <a:endParaRPr lang="en-IN" dirty="0"/>
+                    </a:p>
+                  </a:txBody>
+                  <a:tcPr/>
+                </a:tc>
+                <a:tc>
+                  <a:txBody>
+                    <a:bodyPr/>
+                    <a:lstStyle/>
+                    <a:p>
+                      <a:endParaRPr lang="en-IN" dirty="0"/>
+                    </a:p>
+                  </a:txBody>
+                  <a:tcPr/>
+                </a:tc>
+                <a:tc>
+                  <a:txBody>
+                    <a:bodyPr/>
+                    <a:lstStyle/>
+                    <a:p>
+                      <a:endParaRPr lang="en-IN" dirty="0"/>
+                    </a:p>
+                  </a:txBody>
+                  <a:tcPr/>
+                </a:tc>
+                <a:tc>
+                  <a:txBody>
+                    <a:bodyPr/>
+                    <a:lstStyle/>
+                    <a:p>
+                      <a:endParaRPr lang="en-IN" dirty="0"/>
+                    </a:p>
+                  </a:txBody>
+                  <a:tcPr/>
+                </a:tc>
+                <a:extLst>
+                  <a:ext uri="{0D108BD9-81ED-4DB2-BD59-A6C34878D82A}">
+                    <a16:rowId xmlns:a16="http://schemas.microsoft.com/office/drawing/2014/main" val="1877996509"/>
+                  </a:ext>
+                </a:extLst>
+              </a:tr>
+              <a:tr h="873337">
+                <a:tc>
+                  <a:txBody>
+                    <a:bodyPr/>
+                    <a:lstStyle/>
+                    <a:p>
+                      <a:r>
+                        <a:rPr lang="en-US" dirty="0"/>
+                        <a:t>22</a:t>
+                      </a:r>
+                      <a:endParaRPr lang="en-IN" dirty="0"/>
+                    </a:p>
+                  </a:txBody>
+                  <a:tcPr/>
+                </a:tc>
+                <a:tc>
+                  <a:txBody>
+                    <a:bodyPr/>
+                    <a:lstStyle/>
+                    <a:p>
+                      <a:r>
+                        <a:rPr lang="en-US" dirty="0"/>
+                        <a:t>Segment Anything</a:t>
+                      </a:r>
+                      <a:endParaRPr lang="en-IN" dirty="0"/>
+                    </a:p>
+                  </a:txBody>
+                  <a:tcPr/>
+                </a:tc>
+                <a:tc>
+                  <a:txBody>
+                    <a:bodyPr/>
+                    <a:lstStyle/>
+                    <a:p>
+                      <a:endParaRPr lang="en-IN" dirty="0"/>
+                    </a:p>
+                  </a:txBody>
+                  <a:tcPr/>
+                </a:tc>
+                <a:tc>
+                  <a:txBody>
+                    <a:bodyPr/>
+                    <a:lstStyle/>
+                    <a:p>
+                      <a:endParaRPr lang="en-IN" dirty="0"/>
+                    </a:p>
+                  </a:txBody>
+                  <a:tcPr/>
+                </a:tc>
+                <a:tc>
+                  <a:txBody>
+                    <a:bodyPr/>
+                    <a:lstStyle/>
+                    <a:p>
+                      <a:endParaRPr lang="en-IN" dirty="0"/>
+                    </a:p>
+                  </a:txBody>
+                  <a:tcPr/>
+                </a:tc>
+                <a:tc>
+                  <a:txBody>
+                    <a:bodyPr/>
+                    <a:lstStyle/>
+                    <a:p>
+                      <a:endParaRPr lang="en-IN" dirty="0"/>
+                    </a:p>
+                  </a:txBody>
+                  <a:tcPr/>
+                </a:tc>
+                <a:tc>
+                  <a:txBody>
+                    <a:bodyPr/>
+                    <a:lstStyle/>
+                    <a:p>
+                      <a:endParaRPr lang="en-IN" dirty="0"/>
+                    </a:p>
+                  </a:txBody>
+                  <a:tcPr/>
+                </a:tc>
+                <a:extLst>
+                  <a:ext uri="{0D108BD9-81ED-4DB2-BD59-A6C34878D82A}">
+                    <a16:rowId xmlns:a16="http://schemas.microsoft.com/office/drawing/2014/main" val="2493072846"/>
+                  </a:ext>
+                </a:extLst>
+              </a:tr>
+              <a:tr h="873337">
+                <a:tc>
+                  <a:txBody>
+                    <a:bodyPr/>
+                    <a:lstStyle/>
+                    <a:p>
+                      <a:r>
+                        <a:rPr lang="en-US" dirty="0"/>
+                        <a:t>23</a:t>
+                      </a:r>
+                      <a:endParaRPr lang="en-IN" dirty="0"/>
+                    </a:p>
+                  </a:txBody>
+                  <a:tcPr/>
+                </a:tc>
+                <a:tc>
+                  <a:txBody>
+                    <a:bodyPr/>
+                    <a:lstStyle/>
+                    <a:p>
+                      <a:endParaRPr lang="en-IN" dirty="0"/>
+                    </a:p>
+                  </a:txBody>
+                  <a:tcPr/>
+                </a:tc>
+                <a:tc>
+                  <a:txBody>
+                    <a:bodyPr/>
+                    <a:lstStyle/>
+                    <a:p>
+                      <a:endParaRPr lang="en-IN" dirty="0"/>
+                    </a:p>
+                  </a:txBody>
+                  <a:tcPr/>
+                </a:tc>
+                <a:tc>
+                  <a:txBody>
+                    <a:bodyPr/>
+                    <a:lstStyle/>
+                    <a:p>
+                      <a:endParaRPr lang="en-IN" dirty="0"/>
+                    </a:p>
+                  </a:txBody>
+                  <a:tcPr/>
+                </a:tc>
+                <a:tc>
+                  <a:txBody>
+                    <a:bodyPr/>
+                    <a:lstStyle/>
+                    <a:p>
+                      <a:endParaRPr lang="en-IN" dirty="0"/>
+                    </a:p>
+                  </a:txBody>
+                  <a:tcPr/>
+                </a:tc>
+                <a:tc>
+                  <a:txBody>
+                    <a:bodyPr/>
+                    <a:lstStyle/>
+                    <a:p>
+                      <a:endParaRPr lang="en-IN" dirty="0"/>
+                    </a:p>
+                  </a:txBody>
+                  <a:tcPr/>
+                </a:tc>
+                <a:tc>
+                  <a:txBody>
+                    <a:bodyPr/>
+                    <a:lstStyle/>
+                    <a:p>
+                      <a:endParaRPr lang="en-IN" dirty="0"/>
+                    </a:p>
+                  </a:txBody>
+                  <a:tcPr/>
+                </a:tc>
+                <a:extLst>
+                  <a:ext uri="{0D108BD9-81ED-4DB2-BD59-A6C34878D82A}">
+                    <a16:rowId xmlns:a16="http://schemas.microsoft.com/office/drawing/2014/main" val="2907816467"/>
+                  </a:ext>
+                </a:extLst>
+              </a:tr>
+              <a:tr h="873337">
+                <a:tc>
+                  <a:txBody>
+                    <a:bodyPr/>
+                    <a:lstStyle/>
+                    <a:p>
+                      <a:r>
+                        <a:rPr lang="en-US" dirty="0"/>
+                        <a:t>24</a:t>
+                      </a:r>
+                      <a:endParaRPr lang="en-IN" dirty="0"/>
+                    </a:p>
+                  </a:txBody>
+                  <a:tcPr/>
+                </a:tc>
+                <a:tc>
+                  <a:txBody>
+                    <a:bodyPr/>
+                    <a:lstStyle/>
+                    <a:p>
+                      <a:endParaRPr lang="en-IN" dirty="0"/>
+                    </a:p>
+                  </a:txBody>
+                  <a:tcPr/>
+                </a:tc>
+                <a:tc>
+                  <a:txBody>
+                    <a:bodyPr/>
+                    <a:lstStyle/>
+                    <a:p>
+                      <a:endParaRPr lang="en-IN" dirty="0"/>
+                    </a:p>
+                  </a:txBody>
+                  <a:tcPr/>
+                </a:tc>
+                <a:tc>
+                  <a:txBody>
+                    <a:bodyPr/>
+                    <a:lstStyle/>
+                    <a:p>
+                      <a:endParaRPr lang="en-IN" dirty="0"/>
+                    </a:p>
+                  </a:txBody>
+                  <a:tcPr/>
+                </a:tc>
+                <a:tc>
+                  <a:txBody>
+                    <a:bodyPr/>
+                    <a:lstStyle/>
+                    <a:p>
+                      <a:endParaRPr lang="en-IN" dirty="0"/>
+                    </a:p>
+                  </a:txBody>
+                  <a:tcPr/>
+                </a:tc>
+                <a:tc>
+                  <a:txBody>
+                    <a:bodyPr/>
+                    <a:lstStyle/>
+                    <a:p>
+                      <a:endParaRPr lang="en-IN" dirty="0"/>
+                    </a:p>
+                  </a:txBody>
+                  <a:tcPr/>
+                </a:tc>
+                <a:tc>
+                  <a:txBody>
+                    <a:bodyPr/>
+                    <a:lstStyle/>
+                    <a:p>
+                      <a:endParaRPr lang="en-IN" dirty="0"/>
+                    </a:p>
+                  </a:txBody>
+                  <a:tcPr/>
+                </a:tc>
+                <a:extLst>
+                  <a:ext uri="{0D108BD9-81ED-4DB2-BD59-A6C34878D82A}">
+                    <a16:rowId xmlns:a16="http://schemas.microsoft.com/office/drawing/2014/main" val="3748464164"/>
+                  </a:ext>
+                </a:extLst>
+              </a:tr>
+            </a:tbl>
+          </a:graphicData>
+        </a:graphic>
+      </p:graphicFrame>
       <p:pic>
         <p:nvPicPr>
-          <p:cNvPr id="6" name="Picture 5">
+          <p:cNvPr id="5" name="Picture 4">
             <a:extLst>
               <a:ext uri="{FF2B5EF4-FFF2-40B4-BE49-F238E27FC236}">
-                <a16:creationId xmlns:a16="http://schemas.microsoft.com/office/drawing/2014/main" id="{718070E0-B4E0-8682-FC8F-8AA6E59FAEE3}"/>
+                <a16:creationId xmlns:a16="http://schemas.microsoft.com/office/drawing/2014/main" id="{66EAAC1F-2615-7B00-CA9F-B7029EC28353}"/>
               </a:ext>
             </a:extLst>
           </p:cNvPr>
@@ -7924,7 +9195,7 @@
     </p:spTree>
     <p:extLst>
       <p:ext uri="{BB962C8B-B14F-4D97-AF65-F5344CB8AC3E}">
-        <p14:creationId xmlns:p14="http://schemas.microsoft.com/office/powerpoint/2010/main" val="655096832"/>
+        <p14:creationId xmlns:p14="http://schemas.microsoft.com/office/powerpoint/2010/main" val="1492827380"/>
       </p:ext>
     </p:extLst>
   </p:cSld>

</xml_diff>